<commit_message>
Menus, Pause, Remap, Win
It is done!
</commit_message>
<xml_diff>
--- a/FPS-Maze-Drawing.pptx
+++ b/FPS-Maze-Drawing.pptx
@@ -24,6 +24,9 @@
     <p:sldId id="272" r:id="rId18"/>
     <p:sldId id="273" r:id="rId19"/>
     <p:sldId id="274" r:id="rId20"/>
+    <p:sldId id="275" r:id="rId21"/>
+    <p:sldId id="276" r:id="rId22"/>
+    <p:sldId id="277" r:id="rId23"/>
   </p:sldIdLst>
   <p:sldSz cx="12192000" cy="6858000"/>
   <p:notesSz cx="6858000" cy="9144000"/>
@@ -7114,6 +7117,22 @@
 <file path=ppt/slides/slide19.xml><?xml version="1.0" encoding="utf-8"?>
 <p:sld xmlns:a="http://schemas.openxmlformats.org/drawingml/2006/main" xmlns:r="http://schemas.openxmlformats.org/officeDocument/2006/relationships" xmlns:p="http://schemas.openxmlformats.org/presentationml/2006/main">
   <p:cSld>
+    <p:bg>
+      <p:bgPr>
+        <a:gradFill>
+          <a:gsLst>
+            <a:gs pos="0">
+              <a:srgbClr val="C7A96E"/>
+            </a:gs>
+            <a:gs pos="100000">
+              <a:srgbClr val="B29861"/>
+            </a:gs>
+          </a:gsLst>
+          <a:lin ang="2700000" scaled="1"/>
+        </a:gradFill>
+        <a:effectLst/>
+      </p:bgPr>
+    </p:bg>
     <p:spTree>
       <p:nvGrpSpPr>
         <p:cNvPr id="1" name=""/>
@@ -7128,6 +7147,390 @@
           <a:chExt cx="0" cy="0"/>
         </a:xfrm>
       </p:grpSpPr>
+      <p:sp>
+        <p:nvSpPr>
+          <p:cNvPr id="54" name="Freeform: Shape 53">
+            <a:extLst>
+              <a:ext uri="{FF2B5EF4-FFF2-40B4-BE49-F238E27FC236}">
+                <a16:creationId xmlns:a16="http://schemas.microsoft.com/office/drawing/2014/main" id="{9E96666A-A0D5-4728-A48B-283A9EE3D1AE}"/>
+              </a:ext>
+            </a:extLst>
+          </p:cNvPr>
+          <p:cNvSpPr/>
+          <p:nvPr/>
+        </p:nvSpPr>
+        <p:spPr>
+          <a:xfrm>
+            <a:off x="843280" y="4165600"/>
+            <a:ext cx="2865120" cy="2875280"/>
+          </a:xfrm>
+          <a:custGeom>
+            <a:avLst/>
+            <a:gdLst>
+              <a:gd name="connsiteX0" fmla="*/ 1391920 w 2865120"/>
+              <a:gd name="connsiteY0" fmla="*/ 0 h 2875280"/>
+              <a:gd name="connsiteX1" fmla="*/ 10160 w 2865120"/>
+              <a:gd name="connsiteY1" fmla="*/ 589280 h 2875280"/>
+              <a:gd name="connsiteX2" fmla="*/ 81280 w 2865120"/>
+              <a:gd name="connsiteY2" fmla="*/ 995680 h 2875280"/>
+              <a:gd name="connsiteX3" fmla="*/ 0 w 2865120"/>
+              <a:gd name="connsiteY3" fmla="*/ 1503680 h 2875280"/>
+              <a:gd name="connsiteX4" fmla="*/ 193040 w 2865120"/>
+              <a:gd name="connsiteY4" fmla="*/ 2875280 h 2875280"/>
+              <a:gd name="connsiteX5" fmla="*/ 2865120 w 2865120"/>
+              <a:gd name="connsiteY5" fmla="*/ 2783840 h 2875280"/>
+              <a:gd name="connsiteX6" fmla="*/ 1391920 w 2865120"/>
+              <a:gd name="connsiteY6" fmla="*/ 0 h 2875280"/>
+            </a:gdLst>
+            <a:ahLst/>
+            <a:cxnLst>
+              <a:cxn ang="0">
+                <a:pos x="connsiteX0" y="connsiteY0"/>
+              </a:cxn>
+              <a:cxn ang="0">
+                <a:pos x="connsiteX1" y="connsiteY1"/>
+              </a:cxn>
+              <a:cxn ang="0">
+                <a:pos x="connsiteX2" y="connsiteY2"/>
+              </a:cxn>
+              <a:cxn ang="0">
+                <a:pos x="connsiteX3" y="connsiteY3"/>
+              </a:cxn>
+              <a:cxn ang="0">
+                <a:pos x="connsiteX4" y="connsiteY4"/>
+              </a:cxn>
+              <a:cxn ang="0">
+                <a:pos x="connsiteX5" y="connsiteY5"/>
+              </a:cxn>
+              <a:cxn ang="0">
+                <a:pos x="connsiteX6" y="connsiteY6"/>
+              </a:cxn>
+            </a:cxnLst>
+            <a:rect l="l" t="t" r="r" b="b"/>
+            <a:pathLst>
+              <a:path w="2865120" h="2875280">
+                <a:moveTo>
+                  <a:pt x="1391920" y="0"/>
+                </a:moveTo>
+                <a:lnTo>
+                  <a:pt x="10160" y="589280"/>
+                </a:lnTo>
+                <a:lnTo>
+                  <a:pt x="81280" y="995680"/>
+                </a:lnTo>
+                <a:lnTo>
+                  <a:pt x="0" y="1503680"/>
+                </a:lnTo>
+                <a:lnTo>
+                  <a:pt x="193040" y="2875280"/>
+                </a:lnTo>
+                <a:lnTo>
+                  <a:pt x="2865120" y="2783840"/>
+                </a:lnTo>
+                <a:lnTo>
+                  <a:pt x="1391920" y="0"/>
+                </a:lnTo>
+                <a:close/>
+              </a:path>
+            </a:pathLst>
+          </a:custGeom>
+          <a:solidFill>
+            <a:schemeClr val="dk1">
+              <a:alpha val="30000"/>
+            </a:schemeClr>
+          </a:solidFill>
+          <a:ln>
+            <a:noFill/>
+          </a:ln>
+        </p:spPr>
+        <p:style>
+          <a:lnRef idx="2">
+            <a:schemeClr val="dk1">
+              <a:shade val="50000"/>
+            </a:schemeClr>
+          </a:lnRef>
+          <a:fillRef idx="1">
+            <a:schemeClr val="dk1"/>
+          </a:fillRef>
+          <a:effectRef idx="0">
+            <a:schemeClr val="dk1"/>
+          </a:effectRef>
+          <a:fontRef idx="minor">
+            <a:schemeClr val="lt1"/>
+          </a:fontRef>
+        </p:style>
+        <p:txBody>
+          <a:bodyPr rtlCol="0" anchor="ctr"/>
+          <a:lstStyle/>
+          <a:p>
+            <a:pPr algn="ctr"/>
+            <a:endParaRPr lang="en-US"/>
+          </a:p>
+        </p:txBody>
+      </p:sp>
+      <p:sp>
+        <p:nvSpPr>
+          <p:cNvPr id="17" name="Freeform: Shape 16">
+            <a:extLst>
+              <a:ext uri="{FF2B5EF4-FFF2-40B4-BE49-F238E27FC236}">
+                <a16:creationId xmlns:a16="http://schemas.microsoft.com/office/drawing/2014/main" id="{A03F63E4-09BB-4C1A-A19C-AFA4554D469C}"/>
+              </a:ext>
+            </a:extLst>
+          </p:cNvPr>
+          <p:cNvSpPr/>
+          <p:nvPr/>
+        </p:nvSpPr>
+        <p:spPr>
+          <a:xfrm>
+            <a:off x="1307939" y="1111171"/>
+            <a:ext cx="10961225" cy="5822066"/>
+          </a:xfrm>
+          <a:custGeom>
+            <a:avLst/>
+            <a:gdLst>
+              <a:gd name="connsiteX0" fmla="*/ 10857053 w 10891777"/>
+              <a:gd name="connsiteY0" fmla="*/ 1342663 h 5752617"/>
+              <a:gd name="connsiteX1" fmla="*/ 4201610 w 10891777"/>
+              <a:gd name="connsiteY1" fmla="*/ 0 h 5752617"/>
+              <a:gd name="connsiteX2" fmla="*/ 0 w 10891777"/>
+              <a:gd name="connsiteY2" fmla="*/ 752354 h 5752617"/>
+              <a:gd name="connsiteX3" fmla="*/ 3495555 w 10891777"/>
+              <a:gd name="connsiteY3" fmla="*/ 5752617 h 5752617"/>
+              <a:gd name="connsiteX4" fmla="*/ 10891777 w 10891777"/>
+              <a:gd name="connsiteY4" fmla="*/ 5729468 h 5752617"/>
+              <a:gd name="connsiteX5" fmla="*/ 10857053 w 10891777"/>
+              <a:gd name="connsiteY5" fmla="*/ 1342663 h 5752617"/>
+              <a:gd name="connsiteX0" fmla="*/ 10857053 w 10961225"/>
+              <a:gd name="connsiteY0" fmla="*/ 1342663 h 5822066"/>
+              <a:gd name="connsiteX1" fmla="*/ 4201610 w 10961225"/>
+              <a:gd name="connsiteY1" fmla="*/ 0 h 5822066"/>
+              <a:gd name="connsiteX2" fmla="*/ 0 w 10961225"/>
+              <a:gd name="connsiteY2" fmla="*/ 752354 h 5822066"/>
+              <a:gd name="connsiteX3" fmla="*/ 3495555 w 10961225"/>
+              <a:gd name="connsiteY3" fmla="*/ 5752617 h 5822066"/>
+              <a:gd name="connsiteX4" fmla="*/ 10961225 w 10961225"/>
+              <a:gd name="connsiteY4" fmla="*/ 5822066 h 5822066"/>
+              <a:gd name="connsiteX5" fmla="*/ 10857053 w 10961225"/>
+              <a:gd name="connsiteY5" fmla="*/ 1342663 h 5822066"/>
+            </a:gdLst>
+            <a:ahLst/>
+            <a:cxnLst>
+              <a:cxn ang="0">
+                <a:pos x="connsiteX0" y="connsiteY0"/>
+              </a:cxn>
+              <a:cxn ang="0">
+                <a:pos x="connsiteX1" y="connsiteY1"/>
+              </a:cxn>
+              <a:cxn ang="0">
+                <a:pos x="connsiteX2" y="connsiteY2"/>
+              </a:cxn>
+              <a:cxn ang="0">
+                <a:pos x="connsiteX3" y="connsiteY3"/>
+              </a:cxn>
+              <a:cxn ang="0">
+                <a:pos x="connsiteX4" y="connsiteY4"/>
+              </a:cxn>
+              <a:cxn ang="0">
+                <a:pos x="connsiteX5" y="connsiteY5"/>
+              </a:cxn>
+            </a:cxnLst>
+            <a:rect l="l" t="t" r="r" b="b"/>
+            <a:pathLst>
+              <a:path w="10961225" h="5822066">
+                <a:moveTo>
+                  <a:pt x="10857053" y="1342663"/>
+                </a:moveTo>
+                <a:lnTo>
+                  <a:pt x="4201610" y="0"/>
+                </a:lnTo>
+                <a:lnTo>
+                  <a:pt x="0" y="752354"/>
+                </a:lnTo>
+                <a:lnTo>
+                  <a:pt x="3495555" y="5752617"/>
+                </a:lnTo>
+                <a:lnTo>
+                  <a:pt x="10961225" y="5822066"/>
+                </a:lnTo>
+                <a:lnTo>
+                  <a:pt x="10857053" y="1342663"/>
+                </a:lnTo>
+                <a:close/>
+              </a:path>
+            </a:pathLst>
+          </a:custGeom>
+          <a:solidFill>
+            <a:schemeClr val="dk1">
+              <a:alpha val="30000"/>
+            </a:schemeClr>
+          </a:solidFill>
+          <a:ln>
+            <a:noFill/>
+          </a:ln>
+        </p:spPr>
+        <p:style>
+          <a:lnRef idx="2">
+            <a:schemeClr val="dk1">
+              <a:shade val="50000"/>
+            </a:schemeClr>
+          </a:lnRef>
+          <a:fillRef idx="1">
+            <a:schemeClr val="dk1"/>
+          </a:fillRef>
+          <a:effectRef idx="0">
+            <a:schemeClr val="dk1"/>
+          </a:effectRef>
+          <a:fontRef idx="minor">
+            <a:schemeClr val="lt1"/>
+          </a:fontRef>
+        </p:style>
+        <p:txBody>
+          <a:bodyPr rtlCol="0" anchor="ctr"/>
+          <a:lstStyle/>
+          <a:p>
+            <a:pPr algn="ctr"/>
+            <a:endParaRPr lang="en-US"/>
+          </a:p>
+        </p:txBody>
+      </p:sp>
+      <p:sp>
+        <p:nvSpPr>
+          <p:cNvPr id="3" name="TextBox 2">
+            <a:extLst>
+              <a:ext uri="{FF2B5EF4-FFF2-40B4-BE49-F238E27FC236}">
+                <a16:creationId xmlns:a16="http://schemas.microsoft.com/office/drawing/2014/main" id="{74028095-7E60-4DE1-83BA-DBEC38C32CE6}"/>
+              </a:ext>
+            </a:extLst>
+          </p:cNvPr>
+          <p:cNvSpPr txBox="1"/>
+          <p:nvPr/>
+        </p:nvSpPr>
+        <p:spPr>
+          <a:xfrm>
+            <a:off x="1309296" y="1101013"/>
+            <a:ext cx="4195766" cy="769441"/>
+          </a:xfrm>
+          <a:prstGeom prst="rect">
+            <a:avLst/>
+          </a:prstGeom>
+          <a:solidFill>
+            <a:schemeClr val="bg1">
+              <a:lumMod val="85000"/>
+            </a:schemeClr>
+          </a:solidFill>
+          <a:ln>
+            <a:noFill/>
+          </a:ln>
+        </p:spPr>
+        <p:txBody>
+          <a:bodyPr wrap="square" rtlCol="0">
+            <a:spAutoFit/>
+          </a:bodyPr>
+          <a:lstStyle/>
+          <a:p>
+            <a:r>
+              <a:rPr lang="en-US" sz="4400" dirty="0">
+                <a:latin typeface="Arial Black" panose="020B0A04020102020204" pitchFamily="34" charset="0"/>
+              </a:rPr>
+              <a:t>OPTIC MAZE</a:t>
+            </a:r>
+          </a:p>
+        </p:txBody>
+      </p:sp>
+      <p:sp>
+        <p:nvSpPr>
+          <p:cNvPr id="21" name="Rectangle 20">
+            <a:extLst>
+              <a:ext uri="{FF2B5EF4-FFF2-40B4-BE49-F238E27FC236}">
+                <a16:creationId xmlns:a16="http://schemas.microsoft.com/office/drawing/2014/main" id="{78271245-7743-4E94-9E84-E1ECDAE4ED8E}"/>
+              </a:ext>
+            </a:extLst>
+          </p:cNvPr>
+          <p:cNvSpPr/>
+          <p:nvPr/>
+        </p:nvSpPr>
+        <p:spPr>
+          <a:xfrm>
+            <a:off x="844954" y="4175871"/>
+            <a:ext cx="1388960" cy="584775"/>
+          </a:xfrm>
+          <a:prstGeom prst="rect">
+            <a:avLst/>
+          </a:prstGeom>
+          <a:solidFill>
+            <a:schemeClr val="bg1">
+              <a:lumMod val="85000"/>
+            </a:schemeClr>
+          </a:solidFill>
+          <a:ln>
+            <a:noFill/>
+          </a:ln>
+        </p:spPr>
+        <p:txBody>
+          <a:bodyPr wrap="square" rtlCol="0">
+            <a:spAutoFit/>
+          </a:bodyPr>
+          <a:lstStyle/>
+          <a:p>
+            <a:r>
+              <a:rPr lang="en-US" sz="3200" dirty="0">
+                <a:solidFill>
+                  <a:schemeClr val="tx1"/>
+                </a:solidFill>
+                <a:latin typeface="Arial Black" panose="020B0A04020102020204" pitchFamily="34" charset="0"/>
+              </a:rPr>
+              <a:t>PLAY</a:t>
+            </a:r>
+          </a:p>
+        </p:txBody>
+      </p:sp>
+      <p:sp>
+        <p:nvSpPr>
+          <p:cNvPr id="34" name="Rectangle 33">
+            <a:extLst>
+              <a:ext uri="{FF2B5EF4-FFF2-40B4-BE49-F238E27FC236}">
+                <a16:creationId xmlns:a16="http://schemas.microsoft.com/office/drawing/2014/main" id="{FCE86394-B1FF-404D-A93D-C65FE0292BDF}"/>
+              </a:ext>
+            </a:extLst>
+          </p:cNvPr>
+          <p:cNvSpPr/>
+          <p:nvPr/>
+        </p:nvSpPr>
+        <p:spPr>
+          <a:xfrm>
+            <a:off x="844954" y="5089966"/>
+            <a:ext cx="1388960" cy="584775"/>
+          </a:xfrm>
+          <a:prstGeom prst="rect">
+            <a:avLst/>
+          </a:prstGeom>
+          <a:solidFill>
+            <a:schemeClr val="bg1">
+              <a:lumMod val="85000"/>
+            </a:schemeClr>
+          </a:solidFill>
+          <a:ln>
+            <a:noFill/>
+          </a:ln>
+        </p:spPr>
+        <p:txBody>
+          <a:bodyPr wrap="square" rtlCol="0">
+            <a:spAutoFit/>
+          </a:bodyPr>
+          <a:lstStyle/>
+          <a:p>
+            <a:r>
+              <a:rPr lang="en-US" sz="3200" dirty="0">
+                <a:solidFill>
+                  <a:schemeClr val="tx1"/>
+                </a:solidFill>
+                <a:latin typeface="Arial Black" panose="020B0A04020102020204" pitchFamily="34" charset="0"/>
+              </a:rPr>
+              <a:t>QUIT</a:t>
+            </a:r>
+          </a:p>
+        </p:txBody>
+      </p:sp>
     </p:spTree>
     <p:extLst>
       <p:ext uri="{BB962C8B-B14F-4D97-AF65-F5344CB8AC3E}">
@@ -7246,6 +7649,618 @@
     <p:extLst>
       <p:ext uri="{BB962C8B-B14F-4D97-AF65-F5344CB8AC3E}">
         <p14:creationId xmlns:p14="http://schemas.microsoft.com/office/powerpoint/2010/main" val="2505519349"/>
+      </p:ext>
+    </p:extLst>
+  </p:cSld>
+  <p:clrMapOvr>
+    <a:masterClrMapping/>
+  </p:clrMapOvr>
+</p:sld>
+</file>
+
+<file path=ppt/slides/slide20.xml><?xml version="1.0" encoding="utf-8"?>
+<p:sld xmlns:a="http://schemas.openxmlformats.org/drawingml/2006/main" xmlns:r="http://schemas.openxmlformats.org/officeDocument/2006/relationships" xmlns:p="http://schemas.openxmlformats.org/presentationml/2006/main">
+  <p:cSld>
+    <p:spTree>
+      <p:nvGrpSpPr>
+        <p:cNvPr id="1" name=""/>
+        <p:cNvGrpSpPr/>
+        <p:nvPr/>
+      </p:nvGrpSpPr>
+      <p:grpSpPr>
+        <a:xfrm>
+          <a:off x="0" y="0"/>
+          <a:ext cx="0" cy="0"/>
+          <a:chOff x="0" y="0"/>
+          <a:chExt cx="0" cy="0"/>
+        </a:xfrm>
+      </p:grpSpPr>
+      <p:sp>
+        <p:nvSpPr>
+          <p:cNvPr id="3" name="Oval 2">
+            <a:extLst>
+              <a:ext uri="{FF2B5EF4-FFF2-40B4-BE49-F238E27FC236}">
+                <a16:creationId xmlns:a16="http://schemas.microsoft.com/office/drawing/2014/main" id="{5D05FC70-2452-4685-8F33-66A0675B68EC}"/>
+              </a:ext>
+            </a:extLst>
+          </p:cNvPr>
+          <p:cNvSpPr/>
+          <p:nvPr/>
+        </p:nvSpPr>
+        <p:spPr>
+          <a:xfrm>
+            <a:off x="1320800" y="2326225"/>
+            <a:ext cx="373224" cy="373224"/>
+          </a:xfrm>
+          <a:prstGeom prst="ellipse">
+            <a:avLst/>
+          </a:prstGeom>
+        </p:spPr>
+        <p:style>
+          <a:lnRef idx="2">
+            <a:schemeClr val="dk1">
+              <a:shade val="50000"/>
+            </a:schemeClr>
+          </a:lnRef>
+          <a:fillRef idx="1">
+            <a:schemeClr val="dk1"/>
+          </a:fillRef>
+          <a:effectRef idx="0">
+            <a:schemeClr val="dk1"/>
+          </a:effectRef>
+          <a:fontRef idx="minor">
+            <a:schemeClr val="lt1"/>
+          </a:fontRef>
+        </p:style>
+        <p:txBody>
+          <a:bodyPr rtlCol="0" anchor="ctr"/>
+          <a:lstStyle/>
+          <a:p>
+            <a:pPr algn="ctr"/>
+            <a:endParaRPr lang="en-US"/>
+          </a:p>
+        </p:txBody>
+      </p:sp>
+      <p:sp>
+        <p:nvSpPr>
+          <p:cNvPr id="4" name="Oval 3">
+            <a:extLst>
+              <a:ext uri="{FF2B5EF4-FFF2-40B4-BE49-F238E27FC236}">
+                <a16:creationId xmlns:a16="http://schemas.microsoft.com/office/drawing/2014/main" id="{E9CD6580-78D0-4B94-9BE7-389B4E19D343}"/>
+              </a:ext>
+            </a:extLst>
+          </p:cNvPr>
+          <p:cNvSpPr/>
+          <p:nvPr/>
+        </p:nvSpPr>
+        <p:spPr>
+          <a:xfrm>
+            <a:off x="3410857" y="2102290"/>
+            <a:ext cx="373224" cy="373224"/>
+          </a:xfrm>
+          <a:prstGeom prst="ellipse">
+            <a:avLst/>
+          </a:prstGeom>
+        </p:spPr>
+        <p:style>
+          <a:lnRef idx="2">
+            <a:schemeClr val="dk1">
+              <a:shade val="50000"/>
+            </a:schemeClr>
+          </a:lnRef>
+          <a:fillRef idx="1">
+            <a:schemeClr val="dk1"/>
+          </a:fillRef>
+          <a:effectRef idx="0">
+            <a:schemeClr val="dk1"/>
+          </a:effectRef>
+          <a:fontRef idx="minor">
+            <a:schemeClr val="lt1"/>
+          </a:fontRef>
+        </p:style>
+        <p:txBody>
+          <a:bodyPr rtlCol="0" anchor="ctr"/>
+          <a:lstStyle/>
+          <a:p>
+            <a:pPr algn="ctr"/>
+            <a:endParaRPr lang="en-US"/>
+          </a:p>
+        </p:txBody>
+      </p:sp>
+      <p:sp>
+        <p:nvSpPr>
+          <p:cNvPr id="5" name="Freeform: Shape 4">
+            <a:extLst>
+              <a:ext uri="{FF2B5EF4-FFF2-40B4-BE49-F238E27FC236}">
+                <a16:creationId xmlns:a16="http://schemas.microsoft.com/office/drawing/2014/main" id="{984E134A-CDFC-4E5C-AB14-47324C3DF71E}"/>
+              </a:ext>
+            </a:extLst>
+          </p:cNvPr>
+          <p:cNvSpPr/>
+          <p:nvPr/>
+        </p:nvSpPr>
+        <p:spPr>
+          <a:xfrm rot="9000000">
+            <a:off x="1124857" y="3771515"/>
+            <a:ext cx="3321698" cy="2184318"/>
+          </a:xfrm>
+          <a:custGeom>
+            <a:avLst/>
+            <a:gdLst>
+              <a:gd name="connsiteX0" fmla="*/ 0 w 3321698"/>
+              <a:gd name="connsiteY0" fmla="*/ 1139290 h 2184318"/>
+              <a:gd name="connsiteX1" fmla="*/ 1847461 w 3321698"/>
+              <a:gd name="connsiteY1" fmla="*/ 28947 h 2184318"/>
+              <a:gd name="connsiteX2" fmla="*/ 3321698 w 3321698"/>
+              <a:gd name="connsiteY2" fmla="*/ 2184318 h 2184318"/>
+            </a:gdLst>
+            <a:ahLst/>
+            <a:cxnLst>
+              <a:cxn ang="0">
+                <a:pos x="connsiteX0" y="connsiteY0"/>
+              </a:cxn>
+              <a:cxn ang="0">
+                <a:pos x="connsiteX1" y="connsiteY1"/>
+              </a:cxn>
+              <a:cxn ang="0">
+                <a:pos x="connsiteX2" y="connsiteY2"/>
+              </a:cxn>
+            </a:cxnLst>
+            <a:rect l="l" t="t" r="r" b="b"/>
+            <a:pathLst>
+              <a:path w="3321698" h="2184318">
+                <a:moveTo>
+                  <a:pt x="0" y="1139290"/>
+                </a:moveTo>
+                <a:cubicBezTo>
+                  <a:pt x="646922" y="497033"/>
+                  <a:pt x="1293845" y="-145224"/>
+                  <a:pt x="1847461" y="28947"/>
+                </a:cubicBezTo>
+                <a:cubicBezTo>
+                  <a:pt x="2401077" y="203118"/>
+                  <a:pt x="3043335" y="1924616"/>
+                  <a:pt x="3321698" y="2184318"/>
+                </a:cubicBezTo>
+              </a:path>
+            </a:pathLst>
+          </a:custGeom>
+          <a:ln w="76200" cap="rnd">
+            <a:solidFill>
+              <a:schemeClr val="tx1"/>
+            </a:solidFill>
+          </a:ln>
+        </p:spPr>
+        <p:style>
+          <a:lnRef idx="1">
+            <a:schemeClr val="dk1"/>
+          </a:lnRef>
+          <a:fillRef idx="0">
+            <a:schemeClr val="dk1"/>
+          </a:fillRef>
+          <a:effectRef idx="0">
+            <a:schemeClr val="dk1"/>
+          </a:effectRef>
+          <a:fontRef idx="minor">
+            <a:schemeClr val="tx1"/>
+          </a:fontRef>
+        </p:style>
+        <p:txBody>
+          <a:bodyPr rtlCol="0" anchor="ctr"/>
+          <a:lstStyle/>
+          <a:p>
+            <a:pPr algn="ctr"/>
+            <a:endParaRPr lang="en-US"/>
+          </a:p>
+        </p:txBody>
+      </p:sp>
+      <p:cxnSp>
+        <p:nvCxnSpPr>
+          <p:cNvPr id="6" name="Straight Connector 5">
+            <a:extLst>
+              <a:ext uri="{FF2B5EF4-FFF2-40B4-BE49-F238E27FC236}">
+                <a16:creationId xmlns:a16="http://schemas.microsoft.com/office/drawing/2014/main" id="{9BD07FF3-1662-47FE-A2D7-31805FFC00FC}"/>
+              </a:ext>
+            </a:extLst>
+          </p:cNvPr>
+          <p:cNvCxnSpPr/>
+          <p:nvPr/>
+        </p:nvCxnSpPr>
+        <p:spPr>
+          <a:xfrm>
+            <a:off x="3497838" y="768872"/>
+            <a:ext cx="699796" cy="699796"/>
+          </a:xfrm>
+          <a:prstGeom prst="line">
+            <a:avLst/>
+          </a:prstGeom>
+          <a:ln w="76200" cap="rnd">
+            <a:solidFill>
+              <a:schemeClr val="tx1"/>
+            </a:solidFill>
+          </a:ln>
+        </p:spPr>
+        <p:style>
+          <a:lnRef idx="1">
+            <a:schemeClr val="accent1"/>
+          </a:lnRef>
+          <a:fillRef idx="0">
+            <a:schemeClr val="accent1"/>
+          </a:fillRef>
+          <a:effectRef idx="0">
+            <a:schemeClr val="accent1"/>
+          </a:effectRef>
+          <a:fontRef idx="minor">
+            <a:schemeClr val="tx1"/>
+          </a:fontRef>
+        </p:style>
+      </p:cxnSp>
+      <p:cxnSp>
+        <p:nvCxnSpPr>
+          <p:cNvPr id="7" name="Straight Connector 6">
+            <a:extLst>
+              <a:ext uri="{FF2B5EF4-FFF2-40B4-BE49-F238E27FC236}">
+                <a16:creationId xmlns:a16="http://schemas.microsoft.com/office/drawing/2014/main" id="{0D0EDAFA-FB2A-485B-850F-617C01063507}"/>
+              </a:ext>
+            </a:extLst>
+          </p:cNvPr>
+          <p:cNvCxnSpPr/>
+          <p:nvPr/>
+        </p:nvCxnSpPr>
+        <p:spPr>
+          <a:xfrm flipH="1">
+            <a:off x="959705" y="949144"/>
+            <a:ext cx="295469" cy="885931"/>
+          </a:xfrm>
+          <a:prstGeom prst="line">
+            <a:avLst/>
+          </a:prstGeom>
+          <a:ln w="76200" cap="rnd">
+            <a:solidFill>
+              <a:schemeClr val="tx1"/>
+            </a:solidFill>
+          </a:ln>
+        </p:spPr>
+        <p:style>
+          <a:lnRef idx="1">
+            <a:schemeClr val="accent1"/>
+          </a:lnRef>
+          <a:fillRef idx="0">
+            <a:schemeClr val="accent1"/>
+          </a:fillRef>
+          <a:effectRef idx="0">
+            <a:schemeClr val="accent1"/>
+          </a:effectRef>
+          <a:fontRef idx="minor">
+            <a:schemeClr val="tx1"/>
+          </a:fontRef>
+        </p:style>
+      </p:cxnSp>
+      <p:sp>
+        <p:nvSpPr>
+          <p:cNvPr id="8" name="TextBox 7">
+            <a:extLst>
+              <a:ext uri="{FF2B5EF4-FFF2-40B4-BE49-F238E27FC236}">
+                <a16:creationId xmlns:a16="http://schemas.microsoft.com/office/drawing/2014/main" id="{91BDB3BB-72B5-4A86-AD96-478A759E443B}"/>
+              </a:ext>
+            </a:extLst>
+          </p:cNvPr>
+          <p:cNvSpPr txBox="1"/>
+          <p:nvPr/>
+        </p:nvSpPr>
+        <p:spPr>
+          <a:xfrm>
+            <a:off x="6096000" y="1835075"/>
+            <a:ext cx="4257040" cy="1015663"/>
+          </a:xfrm>
+          <a:prstGeom prst="rect">
+            <a:avLst/>
+          </a:prstGeom>
+          <a:noFill/>
+        </p:spPr>
+        <p:txBody>
+          <a:bodyPr wrap="square" rtlCol="0">
+            <a:spAutoFit/>
+          </a:bodyPr>
+          <a:lstStyle/>
+          <a:p>
+            <a:r>
+              <a:rPr lang="en-US" sz="6000" dirty="0">
+                <a:latin typeface="Arial Black" panose="020B0A04020102020204" pitchFamily="34" charset="0"/>
+              </a:rPr>
+              <a:t>YOU WIN!</a:t>
+            </a:r>
+          </a:p>
+        </p:txBody>
+      </p:sp>
+    </p:spTree>
+    <p:extLst>
+      <p:ext uri="{BB962C8B-B14F-4D97-AF65-F5344CB8AC3E}">
+        <p14:creationId xmlns:p14="http://schemas.microsoft.com/office/powerpoint/2010/main" val="3462599393"/>
+      </p:ext>
+    </p:extLst>
+  </p:cSld>
+  <p:clrMapOvr>
+    <a:masterClrMapping/>
+  </p:clrMapOvr>
+</p:sld>
+</file>
+
+<file path=ppt/slides/slide21.xml><?xml version="1.0" encoding="utf-8"?>
+<p:sld xmlns:a="http://schemas.openxmlformats.org/drawingml/2006/main" xmlns:r="http://schemas.openxmlformats.org/officeDocument/2006/relationships" xmlns:p="http://schemas.openxmlformats.org/presentationml/2006/main">
+  <p:cSld>
+    <p:spTree>
+      <p:nvGrpSpPr>
+        <p:cNvPr id="1" name=""/>
+        <p:cNvGrpSpPr/>
+        <p:nvPr/>
+      </p:nvGrpSpPr>
+      <p:grpSpPr>
+        <a:xfrm>
+          <a:off x="0" y="0"/>
+          <a:ext cx="0" cy="0"/>
+          <a:chOff x="0" y="0"/>
+          <a:chExt cx="0" cy="0"/>
+        </a:xfrm>
+      </p:grpSpPr>
+      <p:sp>
+        <p:nvSpPr>
+          <p:cNvPr id="4" name="Rectangle 3">
+            <a:extLst>
+              <a:ext uri="{FF2B5EF4-FFF2-40B4-BE49-F238E27FC236}">
+                <a16:creationId xmlns:a16="http://schemas.microsoft.com/office/drawing/2014/main" id="{A8EB2306-ECAF-493F-8472-EA2DF97FDEA8}"/>
+              </a:ext>
+            </a:extLst>
+          </p:cNvPr>
+          <p:cNvSpPr/>
+          <p:nvPr/>
+        </p:nvSpPr>
+        <p:spPr>
+          <a:xfrm>
+            <a:off x="0" y="0"/>
+            <a:ext cx="12192000" cy="6858000"/>
+          </a:xfrm>
+          <a:prstGeom prst="rect">
+            <a:avLst/>
+          </a:prstGeom>
+          <a:solidFill>
+            <a:schemeClr val="dk1">
+              <a:alpha val="40000"/>
+            </a:schemeClr>
+          </a:solidFill>
+          <a:ln>
+            <a:noFill/>
+          </a:ln>
+        </p:spPr>
+        <p:style>
+          <a:lnRef idx="2">
+            <a:schemeClr val="dk1">
+              <a:shade val="50000"/>
+            </a:schemeClr>
+          </a:lnRef>
+          <a:fillRef idx="1">
+            <a:schemeClr val="dk1"/>
+          </a:fillRef>
+          <a:effectRef idx="0">
+            <a:schemeClr val="dk1"/>
+          </a:effectRef>
+          <a:fontRef idx="minor">
+            <a:schemeClr val="lt1"/>
+          </a:fontRef>
+        </p:style>
+        <p:txBody>
+          <a:bodyPr rtlCol="0" anchor="ctr"/>
+          <a:lstStyle/>
+          <a:p>
+            <a:pPr algn="ctr"/>
+            <a:endParaRPr lang="en-US"/>
+          </a:p>
+        </p:txBody>
+      </p:sp>
+      <p:sp>
+        <p:nvSpPr>
+          <p:cNvPr id="5" name="Freeform: Shape 4">
+            <a:extLst>
+              <a:ext uri="{FF2B5EF4-FFF2-40B4-BE49-F238E27FC236}">
+                <a16:creationId xmlns:a16="http://schemas.microsoft.com/office/drawing/2014/main" id="{8C09FDB5-13FD-4EAD-857E-C04678204D07}"/>
+              </a:ext>
+            </a:extLst>
+          </p:cNvPr>
+          <p:cNvSpPr>
+            <a:spLocks noGrp="1"/>
+          </p:cNvSpPr>
+          <p:nvPr>
+            <p:ph type="title"/>
+          </p:nvPr>
+        </p:nvSpPr>
+        <p:spPr>
+          <a:xfrm>
+            <a:off x="177800" y="5455921"/>
+            <a:ext cx="1478280" cy="1402079"/>
+          </a:xfrm>
+          <a:custGeom>
+            <a:avLst/>
+            <a:gdLst>
+              <a:gd name="connsiteX0" fmla="*/ 0 w 1478280"/>
+              <a:gd name="connsiteY0" fmla="*/ 0 h 1402079"/>
+              <a:gd name="connsiteX1" fmla="*/ 1478280 w 1478280"/>
+              <a:gd name="connsiteY1" fmla="*/ 0 h 1402079"/>
+              <a:gd name="connsiteX2" fmla="*/ 1478280 w 1478280"/>
+              <a:gd name="connsiteY2" fmla="*/ 1402079 h 1402079"/>
+              <a:gd name="connsiteX3" fmla="*/ 0 w 1478280"/>
+              <a:gd name="connsiteY3" fmla="*/ 1402079 h 1402079"/>
+            </a:gdLst>
+            <a:ahLst/>
+            <a:cxnLst>
+              <a:cxn ang="0">
+                <a:pos x="connsiteX0" y="connsiteY0"/>
+              </a:cxn>
+              <a:cxn ang="0">
+                <a:pos x="connsiteX1" y="connsiteY1"/>
+              </a:cxn>
+              <a:cxn ang="0">
+                <a:pos x="connsiteX2" y="connsiteY2"/>
+              </a:cxn>
+              <a:cxn ang="0">
+                <a:pos x="connsiteX3" y="connsiteY3"/>
+              </a:cxn>
+            </a:cxnLst>
+            <a:rect l="l" t="t" r="r" b="b"/>
+            <a:pathLst>
+              <a:path w="1478280" h="1402079">
+                <a:moveTo>
+                  <a:pt x="0" y="0"/>
+                </a:moveTo>
+                <a:lnTo>
+                  <a:pt x="1478280" y="0"/>
+                </a:lnTo>
+                <a:lnTo>
+                  <a:pt x="1478280" y="1402079"/>
+                </a:lnTo>
+                <a:lnTo>
+                  <a:pt x="0" y="1402079"/>
+                </a:lnTo>
+                <a:close/>
+              </a:path>
+            </a:pathLst>
+          </a:custGeom>
+        </p:spPr>
+        <p:txBody>
+          <a:bodyPr wrap="square">
+            <a:noAutofit/>
+          </a:bodyPr>
+          <a:lstStyle/>
+          <a:p>
+            <a:pPr algn="ctr"/>
+            <a:r>
+              <a:rPr lang="en-US" sz="8800" spc="300" dirty="0">
+                <a:solidFill>
+                  <a:schemeClr val="bg1"/>
+                </a:solidFill>
+                <a:latin typeface="Arial Black" panose="020B0A04020102020204" pitchFamily="34" charset="0"/>
+              </a:rPr>
+              <a:t>II</a:t>
+            </a:r>
+          </a:p>
+        </p:txBody>
+      </p:sp>
+    </p:spTree>
+    <p:extLst>
+      <p:ext uri="{BB962C8B-B14F-4D97-AF65-F5344CB8AC3E}">
+        <p14:creationId xmlns:p14="http://schemas.microsoft.com/office/powerpoint/2010/main" val="578488694"/>
+      </p:ext>
+    </p:extLst>
+  </p:cSld>
+  <p:clrMapOvr>
+    <a:masterClrMapping/>
+  </p:clrMapOvr>
+</p:sld>
+</file>
+
+<file path=ppt/slides/slide22.xml><?xml version="1.0" encoding="utf-8"?>
+<p:sld xmlns:a="http://schemas.openxmlformats.org/drawingml/2006/main" xmlns:r="http://schemas.openxmlformats.org/officeDocument/2006/relationships" xmlns:p="http://schemas.openxmlformats.org/presentationml/2006/main">
+  <p:cSld>
+    <p:spTree>
+      <p:nvGrpSpPr>
+        <p:cNvPr id="1" name=""/>
+        <p:cNvGrpSpPr/>
+        <p:nvPr/>
+      </p:nvGrpSpPr>
+      <p:grpSpPr>
+        <a:xfrm>
+          <a:off x="0" y="0"/>
+          <a:ext cx="0" cy="0"/>
+          <a:chOff x="0" y="0"/>
+          <a:chExt cx="0" cy="0"/>
+        </a:xfrm>
+      </p:grpSpPr>
+      <p:sp>
+        <p:nvSpPr>
+          <p:cNvPr id="4" name="Rectangle 3">
+            <a:extLst>
+              <a:ext uri="{FF2B5EF4-FFF2-40B4-BE49-F238E27FC236}">
+                <a16:creationId xmlns:a16="http://schemas.microsoft.com/office/drawing/2014/main" id="{A8EB2306-ECAF-493F-8472-EA2DF97FDEA8}"/>
+              </a:ext>
+            </a:extLst>
+          </p:cNvPr>
+          <p:cNvSpPr/>
+          <p:nvPr/>
+        </p:nvSpPr>
+        <p:spPr>
+          <a:xfrm>
+            <a:off x="0" y="0"/>
+            <a:ext cx="12192000" cy="6858000"/>
+          </a:xfrm>
+          <a:prstGeom prst="rect">
+            <a:avLst/>
+          </a:prstGeom>
+          <a:solidFill>
+            <a:schemeClr val="dk1">
+              <a:alpha val="40000"/>
+            </a:schemeClr>
+          </a:solidFill>
+          <a:ln>
+            <a:noFill/>
+          </a:ln>
+        </p:spPr>
+        <p:style>
+          <a:lnRef idx="2">
+            <a:schemeClr val="dk1">
+              <a:shade val="50000"/>
+            </a:schemeClr>
+          </a:lnRef>
+          <a:fillRef idx="1">
+            <a:schemeClr val="dk1"/>
+          </a:fillRef>
+          <a:effectRef idx="0">
+            <a:schemeClr val="dk1"/>
+          </a:effectRef>
+          <a:fontRef idx="minor">
+            <a:schemeClr val="lt1"/>
+          </a:fontRef>
+        </p:style>
+        <p:txBody>
+          <a:bodyPr rtlCol="0" anchor="ctr"/>
+          <a:lstStyle/>
+          <a:p>
+            <a:pPr algn="ctr"/>
+            <a:endParaRPr lang="en-US"/>
+          </a:p>
+        </p:txBody>
+      </p:sp>
+      <p:pic>
+        <p:nvPicPr>
+          <p:cNvPr id="2" name="Picture 1">
+            <a:extLst>
+              <a:ext uri="{FF2B5EF4-FFF2-40B4-BE49-F238E27FC236}">
+                <a16:creationId xmlns:a16="http://schemas.microsoft.com/office/drawing/2014/main" id="{28DA7F84-571F-4F47-A1FC-098199A9F0F0}"/>
+              </a:ext>
+            </a:extLst>
+          </p:cNvPr>
+          <p:cNvPicPr>
+            <a:picLocks noChangeAspect="1"/>
+          </p:cNvPicPr>
+          <p:nvPr/>
+        </p:nvPicPr>
+        <p:blipFill rotWithShape="1">
+          <a:blip r:embed="rId2"/>
+          <a:srcRect l="28669" t="21431" r="32000" b="36365"/>
+          <a:stretch/>
+        </p:blipFill>
+        <p:spPr>
+          <a:xfrm>
+            <a:off x="228600" y="5669279"/>
+            <a:ext cx="899160" cy="990601"/>
+          </a:xfrm>
+          <a:prstGeom prst="rect">
+            <a:avLst/>
+          </a:prstGeom>
+        </p:spPr>
+      </p:pic>
+    </p:spTree>
+    <p:extLst>
+      <p:ext uri="{BB962C8B-B14F-4D97-AF65-F5344CB8AC3E}">
+        <p14:creationId xmlns:p14="http://schemas.microsoft.com/office/powerpoint/2010/main" val="3396331986"/>
       </p:ext>
     </p:extLst>
   </p:cSld>

</xml_diff>